<commit_message>
Design complete and poster complete
</commit_message>
<xml_diff>
--- a/Documents/Documentation/Poster for PIP.pptx
+++ b/Documents/Documentation/Poster for PIP.pptx
@@ -251,7 +251,7 @@
           <a:p>
             <a:fld id="{A09615FF-C1AD-4C39-96B2-5B4D7F33D7E0}" type="datetimeFigureOut">
               <a:rPr lang="en-GB" smtClean="0"/>
-              <a:t>24/02/2022</a:t>
+              <a:t>08/03/2022</a:t>
             </a:fld>
             <a:endParaRPr lang="en-GB"/>
           </a:p>
@@ -421,7 +421,7 @@
           <a:p>
             <a:fld id="{A09615FF-C1AD-4C39-96B2-5B4D7F33D7E0}" type="datetimeFigureOut">
               <a:rPr lang="en-GB" smtClean="0"/>
-              <a:t>24/02/2022</a:t>
+              <a:t>08/03/2022</a:t>
             </a:fld>
             <a:endParaRPr lang="en-GB"/>
           </a:p>
@@ -601,7 +601,7 @@
           <a:p>
             <a:fld id="{A09615FF-C1AD-4C39-96B2-5B4D7F33D7E0}" type="datetimeFigureOut">
               <a:rPr lang="en-GB" smtClean="0"/>
-              <a:t>24/02/2022</a:t>
+              <a:t>08/03/2022</a:t>
             </a:fld>
             <a:endParaRPr lang="en-GB"/>
           </a:p>
@@ -771,7 +771,7 @@
           <a:p>
             <a:fld id="{A09615FF-C1AD-4C39-96B2-5B4D7F33D7E0}" type="datetimeFigureOut">
               <a:rPr lang="en-GB" smtClean="0"/>
-              <a:t>24/02/2022</a:t>
+              <a:t>08/03/2022</a:t>
             </a:fld>
             <a:endParaRPr lang="en-GB"/>
           </a:p>
@@ -1015,7 +1015,7 @@
           <a:p>
             <a:fld id="{A09615FF-C1AD-4C39-96B2-5B4D7F33D7E0}" type="datetimeFigureOut">
               <a:rPr lang="en-GB" smtClean="0"/>
-              <a:t>24/02/2022</a:t>
+              <a:t>08/03/2022</a:t>
             </a:fld>
             <a:endParaRPr lang="en-GB"/>
           </a:p>
@@ -1247,7 +1247,7 @@
           <a:p>
             <a:fld id="{A09615FF-C1AD-4C39-96B2-5B4D7F33D7E0}" type="datetimeFigureOut">
               <a:rPr lang="en-GB" smtClean="0"/>
-              <a:t>24/02/2022</a:t>
+              <a:t>08/03/2022</a:t>
             </a:fld>
             <a:endParaRPr lang="en-GB"/>
           </a:p>
@@ -1614,7 +1614,7 @@
           <a:p>
             <a:fld id="{A09615FF-C1AD-4C39-96B2-5B4D7F33D7E0}" type="datetimeFigureOut">
               <a:rPr lang="en-GB" smtClean="0"/>
-              <a:t>24/02/2022</a:t>
+              <a:t>08/03/2022</a:t>
             </a:fld>
             <a:endParaRPr lang="en-GB"/>
           </a:p>
@@ -1732,7 +1732,7 @@
           <a:p>
             <a:fld id="{A09615FF-C1AD-4C39-96B2-5B4D7F33D7E0}" type="datetimeFigureOut">
               <a:rPr lang="en-GB" smtClean="0"/>
-              <a:t>24/02/2022</a:t>
+              <a:t>08/03/2022</a:t>
             </a:fld>
             <a:endParaRPr lang="en-GB"/>
           </a:p>
@@ -1827,7 +1827,7 @@
           <a:p>
             <a:fld id="{A09615FF-C1AD-4C39-96B2-5B4D7F33D7E0}" type="datetimeFigureOut">
               <a:rPr lang="en-GB" smtClean="0"/>
-              <a:t>24/02/2022</a:t>
+              <a:t>08/03/2022</a:t>
             </a:fld>
             <a:endParaRPr lang="en-GB"/>
           </a:p>
@@ -2104,7 +2104,7 @@
           <a:p>
             <a:fld id="{A09615FF-C1AD-4C39-96B2-5B4D7F33D7E0}" type="datetimeFigureOut">
               <a:rPr lang="en-GB" smtClean="0"/>
-              <a:t>24/02/2022</a:t>
+              <a:t>08/03/2022</a:t>
             </a:fld>
             <a:endParaRPr lang="en-GB"/>
           </a:p>
@@ -2361,7 +2361,7 @@
           <a:p>
             <a:fld id="{A09615FF-C1AD-4C39-96B2-5B4D7F33D7E0}" type="datetimeFigureOut">
               <a:rPr lang="en-GB" smtClean="0"/>
-              <a:t>24/02/2022</a:t>
+              <a:t>08/03/2022</a:t>
             </a:fld>
             <a:endParaRPr lang="en-GB"/>
           </a:p>
@@ -2574,7 +2574,7 @@
           <a:p>
             <a:fld id="{A09615FF-C1AD-4C39-96B2-5B4D7F33D7E0}" type="datetimeFigureOut">
               <a:rPr lang="en-GB" smtClean="0"/>
-              <a:t>24/02/2022</a:t>
+              <a:t>08/03/2022</a:t>
             </a:fld>
             <a:endParaRPr lang="en-GB"/>
           </a:p>
@@ -4044,7 +4044,7 @@
                 <a:ea typeface="Calibri" panose="020F0502020204030204" pitchFamily="34" charset="0"/>
                 <a:cs typeface="Arial" panose="020B0604020202020204" pitchFamily="34" charset="0"/>
               </a:rPr>
-              <a:t>This sprint will be 2 days long. In this sprint, basic project setup will be completed. Such as importing all libraries and packages that will be needed include Oculus integrations, creating a very basic prototype application to test all packages are working correctly and everything was setup and imported correctly.</a:t>
+              <a:t>In this sprint, basic project setup will be completed. Such as importing all libraries and packages that will be needed include Oculus integrations, creating a very basic prototype application to test all packages are working correctly and everything was setup and imported correctly.</a:t>
             </a:r>
           </a:p>
           <a:p>

</xml_diff>